<commit_message>
Added new, relabeled state table
</commit_message>
<xml_diff>
--- a/State Diagram for Final Project.pptx
+++ b/State Diagram for Final Project.pptx
@@ -6,6 +6,7 @@
   </p:sldMasterIdLst>
   <p:sldIdLst>
     <p:sldId id="256" r:id="rId2"/>
+    <p:sldId id="257" r:id="rId3"/>
   </p:sldIdLst>
   <p:sldSz cx="12192000" cy="6858000"/>
   <p:notesSz cx="6858000" cy="9144000"/>
@@ -243,7 +244,7 @@
           <a:p>
             <a:fld id="{C4F88174-3110-418A-950E-2BC3BBB2F7E9}" type="datetimeFigureOut">
               <a:rPr lang="en-US" smtClean="0"/>
-              <a:t>11/17/2014</a:t>
+              <a:t>12/2/2014</a:t>
             </a:fld>
             <a:endParaRPr lang="en-US"/>
           </a:p>
@@ -413,7 +414,7 @@
           <a:p>
             <a:fld id="{C4F88174-3110-418A-950E-2BC3BBB2F7E9}" type="datetimeFigureOut">
               <a:rPr lang="en-US" smtClean="0"/>
-              <a:t>11/17/2014</a:t>
+              <a:t>12/2/2014</a:t>
             </a:fld>
             <a:endParaRPr lang="en-US"/>
           </a:p>
@@ -593,7 +594,7 @@
           <a:p>
             <a:fld id="{C4F88174-3110-418A-950E-2BC3BBB2F7E9}" type="datetimeFigureOut">
               <a:rPr lang="en-US" smtClean="0"/>
-              <a:t>11/17/2014</a:t>
+              <a:t>12/2/2014</a:t>
             </a:fld>
             <a:endParaRPr lang="en-US"/>
           </a:p>
@@ -763,7 +764,7 @@
           <a:p>
             <a:fld id="{C4F88174-3110-418A-950E-2BC3BBB2F7E9}" type="datetimeFigureOut">
               <a:rPr lang="en-US" smtClean="0"/>
-              <a:t>11/17/2014</a:t>
+              <a:t>12/2/2014</a:t>
             </a:fld>
             <a:endParaRPr lang="en-US"/>
           </a:p>
@@ -1009,7 +1010,7 @@
           <a:p>
             <a:fld id="{C4F88174-3110-418A-950E-2BC3BBB2F7E9}" type="datetimeFigureOut">
               <a:rPr lang="en-US" smtClean="0"/>
-              <a:t>11/17/2014</a:t>
+              <a:t>12/2/2014</a:t>
             </a:fld>
             <a:endParaRPr lang="en-US"/>
           </a:p>
@@ -1241,7 +1242,7 @@
           <a:p>
             <a:fld id="{C4F88174-3110-418A-950E-2BC3BBB2F7E9}" type="datetimeFigureOut">
               <a:rPr lang="en-US" smtClean="0"/>
-              <a:t>11/17/2014</a:t>
+              <a:t>12/2/2014</a:t>
             </a:fld>
             <a:endParaRPr lang="en-US"/>
           </a:p>
@@ -1608,7 +1609,7 @@
           <a:p>
             <a:fld id="{C4F88174-3110-418A-950E-2BC3BBB2F7E9}" type="datetimeFigureOut">
               <a:rPr lang="en-US" smtClean="0"/>
-              <a:t>11/17/2014</a:t>
+              <a:t>12/2/2014</a:t>
             </a:fld>
             <a:endParaRPr lang="en-US"/>
           </a:p>
@@ -1726,7 +1727,7 @@
           <a:p>
             <a:fld id="{C4F88174-3110-418A-950E-2BC3BBB2F7E9}" type="datetimeFigureOut">
               <a:rPr lang="en-US" smtClean="0"/>
-              <a:t>11/17/2014</a:t>
+              <a:t>12/2/2014</a:t>
             </a:fld>
             <a:endParaRPr lang="en-US"/>
           </a:p>
@@ -1821,7 +1822,7 @@
           <a:p>
             <a:fld id="{C4F88174-3110-418A-950E-2BC3BBB2F7E9}" type="datetimeFigureOut">
               <a:rPr lang="en-US" smtClean="0"/>
-              <a:t>11/17/2014</a:t>
+              <a:t>12/2/2014</a:t>
             </a:fld>
             <a:endParaRPr lang="en-US"/>
           </a:p>
@@ -2098,7 +2099,7 @@
           <a:p>
             <a:fld id="{C4F88174-3110-418A-950E-2BC3BBB2F7E9}" type="datetimeFigureOut">
               <a:rPr lang="en-US" smtClean="0"/>
-              <a:t>11/17/2014</a:t>
+              <a:t>12/2/2014</a:t>
             </a:fld>
             <a:endParaRPr lang="en-US"/>
           </a:p>
@@ -2351,7 +2352,7 @@
           <a:p>
             <a:fld id="{C4F88174-3110-418A-950E-2BC3BBB2F7E9}" type="datetimeFigureOut">
               <a:rPr lang="en-US" smtClean="0"/>
-              <a:t>11/17/2014</a:t>
+              <a:t>12/2/2014</a:t>
             </a:fld>
             <a:endParaRPr lang="en-US"/>
           </a:p>
@@ -2564,7 +2565,7 @@
           <a:p>
             <a:fld id="{C4F88174-3110-418A-950E-2BC3BBB2F7E9}" type="datetimeFigureOut">
               <a:rPr lang="en-US" smtClean="0"/>
-              <a:t>11/17/2014</a:t>
+              <a:t>12/2/2014</a:t>
             </a:fld>
             <a:endParaRPr lang="en-US"/>
           </a:p>
@@ -5416,6 +5417,2423 @@
     <p:extLst>
       <p:ext uri="{BB962C8B-B14F-4D97-AF65-F5344CB8AC3E}">
         <p14:creationId xmlns:p14="http://schemas.microsoft.com/office/powerpoint/2010/main" val="3981923865"/>
+      </p:ext>
+    </p:extLst>
+  </p:cSld>
+  <p:clrMapOvr>
+    <a:masterClrMapping/>
+  </p:clrMapOvr>
+</p:sld>
+</file>
+
+<file path=ppt/slides/slide2.xml><?xml version="1.0" encoding="utf-8"?>
+<p:sld xmlns:a="http://schemas.openxmlformats.org/drawingml/2006/main" xmlns:r="http://schemas.openxmlformats.org/officeDocument/2006/relationships" xmlns:p="http://schemas.openxmlformats.org/presentationml/2006/main">
+  <p:cSld>
+    <p:spTree>
+      <p:nvGrpSpPr>
+        <p:cNvPr id="1" name=""/>
+        <p:cNvGrpSpPr/>
+        <p:nvPr/>
+      </p:nvGrpSpPr>
+      <p:grpSpPr>
+        <a:xfrm>
+          <a:off x="0" y="0"/>
+          <a:ext cx="0" cy="0"/>
+          <a:chOff x="0" y="0"/>
+          <a:chExt cx="0" cy="0"/>
+        </a:xfrm>
+      </p:grpSpPr>
+      <p:sp>
+        <p:nvSpPr>
+          <p:cNvPr id="4" name="Flowchart: Connector 3"/>
+          <p:cNvSpPr/>
+          <p:nvPr/>
+        </p:nvSpPr>
+        <p:spPr>
+          <a:xfrm>
+            <a:off x="814242" y="5423762"/>
+            <a:ext cx="914400" cy="914400"/>
+          </a:xfrm>
+          <a:prstGeom prst="flowChartConnector">
+            <a:avLst/>
+          </a:prstGeom>
+        </p:spPr>
+        <p:style>
+          <a:lnRef idx="2">
+            <a:schemeClr val="accent1">
+              <a:shade val="50000"/>
+            </a:schemeClr>
+          </a:lnRef>
+          <a:fillRef idx="1">
+            <a:schemeClr val="accent1"/>
+          </a:fillRef>
+          <a:effectRef idx="0">
+            <a:schemeClr val="accent1"/>
+          </a:effectRef>
+          <a:fontRef idx="minor">
+            <a:schemeClr val="lt1"/>
+          </a:fontRef>
+        </p:style>
+        <p:txBody>
+          <a:bodyPr rtlCol="0" anchor="ctr"/>
+          <a:lstStyle/>
+          <a:p>
+            <a:pPr algn="ctr"/>
+            <a:r>
+              <a:rPr lang="en-US" sz="1400" dirty="0" smtClean="0"/>
+              <a:t>d7</a:t>
+            </a:r>
+            <a:endParaRPr lang="en-US" sz="1400" dirty="0"/>
+          </a:p>
+        </p:txBody>
+      </p:sp>
+      <p:sp>
+        <p:nvSpPr>
+          <p:cNvPr id="5" name="Flowchart: Connector 4"/>
+          <p:cNvSpPr/>
+          <p:nvPr/>
+        </p:nvSpPr>
+        <p:spPr>
+          <a:xfrm>
+            <a:off x="2759795" y="145855"/>
+            <a:ext cx="914400" cy="914400"/>
+          </a:xfrm>
+          <a:prstGeom prst="flowChartConnector">
+            <a:avLst/>
+          </a:prstGeom>
+        </p:spPr>
+        <p:style>
+          <a:lnRef idx="2">
+            <a:schemeClr val="accent1">
+              <a:shade val="50000"/>
+            </a:schemeClr>
+          </a:lnRef>
+          <a:fillRef idx="1">
+            <a:schemeClr val="accent1"/>
+          </a:fillRef>
+          <a:effectRef idx="0">
+            <a:schemeClr val="accent1"/>
+          </a:effectRef>
+          <a:fontRef idx="minor">
+            <a:schemeClr val="lt1"/>
+          </a:fontRef>
+        </p:style>
+        <p:txBody>
+          <a:bodyPr rtlCol="0" anchor="ctr"/>
+          <a:lstStyle/>
+          <a:p>
+            <a:pPr algn="ctr"/>
+            <a:r>
+              <a:rPr lang="en-US" sz="1400" dirty="0" smtClean="0"/>
+              <a:t>d0</a:t>
+            </a:r>
+            <a:endParaRPr lang="en-US" sz="1400" dirty="0"/>
+          </a:p>
+        </p:txBody>
+      </p:sp>
+      <p:sp>
+        <p:nvSpPr>
+          <p:cNvPr id="6" name="Flowchart: Connector 5"/>
+          <p:cNvSpPr/>
+          <p:nvPr/>
+        </p:nvSpPr>
+        <p:spPr>
+          <a:xfrm>
+            <a:off x="439416" y="440141"/>
+            <a:ext cx="914400" cy="914400"/>
+          </a:xfrm>
+          <a:prstGeom prst="flowChartConnector">
+            <a:avLst/>
+          </a:prstGeom>
+        </p:spPr>
+        <p:style>
+          <a:lnRef idx="2">
+            <a:schemeClr val="accent1">
+              <a:shade val="50000"/>
+            </a:schemeClr>
+          </a:lnRef>
+          <a:fillRef idx="1">
+            <a:schemeClr val="accent1"/>
+          </a:fillRef>
+          <a:effectRef idx="0">
+            <a:schemeClr val="accent1"/>
+          </a:effectRef>
+          <a:fontRef idx="minor">
+            <a:schemeClr val="lt1"/>
+          </a:fontRef>
+        </p:style>
+        <p:txBody>
+          <a:bodyPr rtlCol="0" anchor="ctr"/>
+          <a:lstStyle/>
+          <a:p>
+            <a:pPr algn="ctr"/>
+            <a:r>
+              <a:rPr lang="en-US" sz="1400" dirty="0" smtClean="0"/>
+              <a:t>d2</a:t>
+            </a:r>
+            <a:endParaRPr lang="en-US" sz="1400" dirty="0"/>
+          </a:p>
+        </p:txBody>
+      </p:sp>
+      <p:sp>
+        <p:nvSpPr>
+          <p:cNvPr id="7" name="Flowchart: Connector 6"/>
+          <p:cNvSpPr/>
+          <p:nvPr/>
+        </p:nvSpPr>
+        <p:spPr>
+          <a:xfrm>
+            <a:off x="6255828" y="215783"/>
+            <a:ext cx="914400" cy="914400"/>
+          </a:xfrm>
+          <a:prstGeom prst="flowChartConnector">
+            <a:avLst/>
+          </a:prstGeom>
+        </p:spPr>
+        <p:style>
+          <a:lnRef idx="2">
+            <a:schemeClr val="accent1">
+              <a:shade val="50000"/>
+            </a:schemeClr>
+          </a:lnRef>
+          <a:fillRef idx="1">
+            <a:schemeClr val="accent1"/>
+          </a:fillRef>
+          <a:effectRef idx="0">
+            <a:schemeClr val="accent1"/>
+          </a:effectRef>
+          <a:fontRef idx="minor">
+            <a:schemeClr val="lt1"/>
+          </a:fontRef>
+        </p:style>
+        <p:txBody>
+          <a:bodyPr rtlCol="0" anchor="ctr"/>
+          <a:lstStyle/>
+          <a:p>
+            <a:pPr algn="ctr"/>
+            <a:r>
+              <a:rPr lang="en-US" sz="1400" dirty="0" smtClean="0"/>
+              <a:t>d1</a:t>
+            </a:r>
+            <a:endParaRPr lang="en-US" sz="1400" dirty="0"/>
+          </a:p>
+        </p:txBody>
+      </p:sp>
+      <p:sp>
+        <p:nvSpPr>
+          <p:cNvPr id="8" name="Flowchart: Connector 7"/>
+          <p:cNvSpPr/>
+          <p:nvPr/>
+        </p:nvSpPr>
+        <p:spPr>
+          <a:xfrm>
+            <a:off x="898705" y="3090878"/>
+            <a:ext cx="914400" cy="914400"/>
+          </a:xfrm>
+          <a:prstGeom prst="flowChartConnector">
+            <a:avLst/>
+          </a:prstGeom>
+        </p:spPr>
+        <p:style>
+          <a:lnRef idx="2">
+            <a:schemeClr val="accent1">
+              <a:shade val="50000"/>
+            </a:schemeClr>
+          </a:lnRef>
+          <a:fillRef idx="1">
+            <a:schemeClr val="accent1"/>
+          </a:fillRef>
+          <a:effectRef idx="0">
+            <a:schemeClr val="accent1"/>
+          </a:effectRef>
+          <a:fontRef idx="minor">
+            <a:schemeClr val="lt1"/>
+          </a:fontRef>
+        </p:style>
+        <p:txBody>
+          <a:bodyPr rtlCol="0" anchor="ctr"/>
+          <a:lstStyle/>
+          <a:p>
+            <a:pPr algn="ctr"/>
+            <a:r>
+              <a:rPr lang="en-US" sz="1400" dirty="0" smtClean="0"/>
+              <a:t>d6</a:t>
+            </a:r>
+            <a:endParaRPr lang="en-US" sz="1400" dirty="0"/>
+          </a:p>
+        </p:txBody>
+      </p:sp>
+      <p:sp>
+        <p:nvSpPr>
+          <p:cNvPr id="9" name="Flowchart: Connector 8"/>
+          <p:cNvSpPr/>
+          <p:nvPr/>
+        </p:nvSpPr>
+        <p:spPr>
+          <a:xfrm>
+            <a:off x="2348675" y="4746981"/>
+            <a:ext cx="914400" cy="914400"/>
+          </a:xfrm>
+          <a:prstGeom prst="flowChartConnector">
+            <a:avLst/>
+          </a:prstGeom>
+        </p:spPr>
+        <p:style>
+          <a:lnRef idx="1">
+            <a:schemeClr val="accent4"/>
+          </a:lnRef>
+          <a:fillRef idx="2">
+            <a:schemeClr val="accent4"/>
+          </a:fillRef>
+          <a:effectRef idx="1">
+            <a:schemeClr val="accent4"/>
+          </a:effectRef>
+          <a:fontRef idx="minor">
+            <a:schemeClr val="dk1"/>
+          </a:fontRef>
+        </p:style>
+        <p:txBody>
+          <a:bodyPr rtlCol="0" anchor="ctr"/>
+          <a:lstStyle/>
+          <a:p>
+            <a:pPr algn="ctr"/>
+            <a:r>
+              <a:rPr lang="en-US" sz="1400" dirty="0" smtClean="0"/>
+              <a:t>c5</a:t>
+            </a:r>
+            <a:endParaRPr lang="en-US" sz="1400" dirty="0"/>
+          </a:p>
+        </p:txBody>
+      </p:sp>
+      <p:sp>
+        <p:nvSpPr>
+          <p:cNvPr id="10" name="Flowchart: Connector 9"/>
+          <p:cNvSpPr/>
+          <p:nvPr/>
+        </p:nvSpPr>
+        <p:spPr>
+          <a:xfrm>
+            <a:off x="4671940" y="3072841"/>
+            <a:ext cx="914400" cy="914400"/>
+          </a:xfrm>
+          <a:prstGeom prst="flowChartConnector">
+            <a:avLst/>
+          </a:prstGeom>
+        </p:spPr>
+        <p:style>
+          <a:lnRef idx="2">
+            <a:schemeClr val="accent1">
+              <a:shade val="50000"/>
+            </a:schemeClr>
+          </a:lnRef>
+          <a:fillRef idx="1">
+            <a:schemeClr val="accent1"/>
+          </a:fillRef>
+          <a:effectRef idx="0">
+            <a:schemeClr val="accent1"/>
+          </a:effectRef>
+          <a:fontRef idx="minor">
+            <a:schemeClr val="lt1"/>
+          </a:fontRef>
+        </p:style>
+        <p:txBody>
+          <a:bodyPr rtlCol="0" anchor="ctr"/>
+          <a:lstStyle/>
+          <a:p>
+            <a:pPr algn="ctr"/>
+            <a:r>
+              <a:rPr lang="en-US" sz="1400" dirty="0" smtClean="0"/>
+              <a:t>d4</a:t>
+            </a:r>
+            <a:endParaRPr lang="en-US" sz="1400" dirty="0"/>
+          </a:p>
+        </p:txBody>
+      </p:sp>
+      <p:sp>
+        <p:nvSpPr>
+          <p:cNvPr id="11" name="Flowchart: Connector 10"/>
+          <p:cNvSpPr/>
+          <p:nvPr/>
+        </p:nvSpPr>
+        <p:spPr>
+          <a:xfrm>
+            <a:off x="3948875" y="4437647"/>
+            <a:ext cx="914400" cy="914400"/>
+          </a:xfrm>
+          <a:prstGeom prst="flowChartConnector">
+            <a:avLst/>
+          </a:prstGeom>
+        </p:spPr>
+        <p:style>
+          <a:lnRef idx="1">
+            <a:schemeClr val="accent4"/>
+          </a:lnRef>
+          <a:fillRef idx="2">
+            <a:schemeClr val="accent4"/>
+          </a:fillRef>
+          <a:effectRef idx="1">
+            <a:schemeClr val="accent4"/>
+          </a:effectRef>
+          <a:fontRef idx="minor">
+            <a:schemeClr val="dk1"/>
+          </a:fontRef>
+        </p:style>
+        <p:txBody>
+          <a:bodyPr rtlCol="0" anchor="ctr"/>
+          <a:lstStyle/>
+          <a:p>
+            <a:pPr algn="ctr"/>
+            <a:r>
+              <a:rPr lang="en-US" sz="1400" dirty="0" smtClean="0"/>
+              <a:t>c3</a:t>
+            </a:r>
+            <a:endParaRPr lang="en-US" sz="1400" dirty="0"/>
+          </a:p>
+        </p:txBody>
+      </p:sp>
+      <p:sp>
+        <p:nvSpPr>
+          <p:cNvPr id="12" name="Flowchart: Connector 11"/>
+          <p:cNvSpPr/>
+          <p:nvPr/>
+        </p:nvSpPr>
+        <p:spPr>
+          <a:xfrm>
+            <a:off x="7840541" y="4593742"/>
+            <a:ext cx="914400" cy="914400"/>
+          </a:xfrm>
+          <a:prstGeom prst="flowChartConnector">
+            <a:avLst/>
+          </a:prstGeom>
+        </p:spPr>
+        <p:style>
+          <a:lnRef idx="2">
+            <a:schemeClr val="accent1">
+              <a:shade val="50000"/>
+            </a:schemeClr>
+          </a:lnRef>
+          <a:fillRef idx="1">
+            <a:schemeClr val="accent1"/>
+          </a:fillRef>
+          <a:effectRef idx="0">
+            <a:schemeClr val="accent1"/>
+          </a:effectRef>
+          <a:fontRef idx="minor">
+            <a:schemeClr val="lt1"/>
+          </a:fontRef>
+        </p:style>
+        <p:txBody>
+          <a:bodyPr rtlCol="0" anchor="ctr"/>
+          <a:lstStyle/>
+          <a:p>
+            <a:pPr algn="ctr"/>
+            <a:r>
+              <a:rPr lang="en-US" sz="1400" dirty="0" smtClean="0"/>
+              <a:t>d5</a:t>
+            </a:r>
+            <a:endParaRPr lang="en-US" sz="1400" dirty="0" smtClean="0"/>
+          </a:p>
+        </p:txBody>
+      </p:sp>
+      <p:sp>
+        <p:nvSpPr>
+          <p:cNvPr id="13" name="Flowchart: Connector 12"/>
+          <p:cNvSpPr/>
+          <p:nvPr/>
+        </p:nvSpPr>
+        <p:spPr>
+          <a:xfrm>
+            <a:off x="6386183" y="3049881"/>
+            <a:ext cx="914400" cy="914400"/>
+          </a:xfrm>
+          <a:prstGeom prst="flowChartConnector">
+            <a:avLst/>
+          </a:prstGeom>
+        </p:spPr>
+        <p:style>
+          <a:lnRef idx="1">
+            <a:schemeClr val="accent4"/>
+          </a:lnRef>
+          <a:fillRef idx="2">
+            <a:schemeClr val="accent4"/>
+          </a:fillRef>
+          <a:effectRef idx="1">
+            <a:schemeClr val="accent4"/>
+          </a:effectRef>
+          <a:fontRef idx="minor">
+            <a:schemeClr val="dk1"/>
+          </a:fontRef>
+        </p:style>
+        <p:txBody>
+          <a:bodyPr rtlCol="0" anchor="ctr"/>
+          <a:lstStyle/>
+          <a:p>
+            <a:pPr algn="ctr"/>
+            <a:r>
+              <a:rPr lang="en-US" sz="1400" dirty="0" smtClean="0"/>
+              <a:t>c7</a:t>
+            </a:r>
+            <a:endParaRPr lang="en-US" sz="1400" dirty="0"/>
+          </a:p>
+        </p:txBody>
+      </p:sp>
+      <p:sp>
+        <p:nvSpPr>
+          <p:cNvPr id="14" name="Flowchart: Connector 13"/>
+          <p:cNvSpPr/>
+          <p:nvPr/>
+        </p:nvSpPr>
+        <p:spPr>
+          <a:xfrm>
+            <a:off x="3133319" y="1372589"/>
+            <a:ext cx="914400" cy="914400"/>
+          </a:xfrm>
+          <a:prstGeom prst="flowChartConnector">
+            <a:avLst/>
+          </a:prstGeom>
+        </p:spPr>
+        <p:style>
+          <a:lnRef idx="1">
+            <a:schemeClr val="accent4"/>
+          </a:lnRef>
+          <a:fillRef idx="2">
+            <a:schemeClr val="accent4"/>
+          </a:fillRef>
+          <a:effectRef idx="1">
+            <a:schemeClr val="accent4"/>
+          </a:effectRef>
+          <a:fontRef idx="minor">
+            <a:schemeClr val="dk1"/>
+          </a:fontRef>
+        </p:style>
+        <p:txBody>
+          <a:bodyPr rtlCol="0" anchor="ctr"/>
+          <a:lstStyle/>
+          <a:p>
+            <a:pPr algn="ctr"/>
+            <a:r>
+              <a:rPr lang="en-US" sz="1400" dirty="0" smtClean="0"/>
+              <a:t>c0</a:t>
+            </a:r>
+            <a:endParaRPr lang="en-US" sz="1400" dirty="0"/>
+          </a:p>
+        </p:txBody>
+      </p:sp>
+      <p:sp>
+        <p:nvSpPr>
+          <p:cNvPr id="15" name="Flowchart: Connector 14"/>
+          <p:cNvSpPr/>
+          <p:nvPr/>
+        </p:nvSpPr>
+        <p:spPr>
+          <a:xfrm>
+            <a:off x="2621996" y="2295980"/>
+            <a:ext cx="914400" cy="914400"/>
+          </a:xfrm>
+          <a:prstGeom prst="flowChartConnector">
+            <a:avLst/>
+          </a:prstGeom>
+        </p:spPr>
+        <p:style>
+          <a:lnRef idx="1">
+            <a:schemeClr val="accent4"/>
+          </a:lnRef>
+          <a:fillRef idx="2">
+            <a:schemeClr val="accent4"/>
+          </a:fillRef>
+          <a:effectRef idx="1">
+            <a:schemeClr val="accent4"/>
+          </a:effectRef>
+          <a:fontRef idx="minor">
+            <a:schemeClr val="dk1"/>
+          </a:fontRef>
+        </p:style>
+        <p:txBody>
+          <a:bodyPr rtlCol="0" anchor="ctr"/>
+          <a:lstStyle/>
+          <a:p>
+            <a:pPr algn="ctr"/>
+            <a:r>
+              <a:rPr lang="en-US" sz="1400" dirty="0" smtClean="0"/>
+              <a:t>c2</a:t>
+            </a:r>
+            <a:endParaRPr lang="en-US" sz="1400" dirty="0"/>
+          </a:p>
+        </p:txBody>
+      </p:sp>
+      <p:sp>
+        <p:nvSpPr>
+          <p:cNvPr id="16" name="Flowchart: Connector 15"/>
+          <p:cNvSpPr/>
+          <p:nvPr/>
+        </p:nvSpPr>
+        <p:spPr>
+          <a:xfrm>
+            <a:off x="9129503" y="852492"/>
+            <a:ext cx="914400" cy="914400"/>
+          </a:xfrm>
+          <a:prstGeom prst="flowChartConnector">
+            <a:avLst/>
+          </a:prstGeom>
+        </p:spPr>
+        <p:style>
+          <a:lnRef idx="1">
+            <a:schemeClr val="accent4"/>
+          </a:lnRef>
+          <a:fillRef idx="2">
+            <a:schemeClr val="accent4"/>
+          </a:fillRef>
+          <a:effectRef idx="1">
+            <a:schemeClr val="accent4"/>
+          </a:effectRef>
+          <a:fontRef idx="minor">
+            <a:schemeClr val="dk1"/>
+          </a:fontRef>
+        </p:style>
+        <p:txBody>
+          <a:bodyPr rtlCol="0" anchor="ctr"/>
+          <a:lstStyle/>
+          <a:p>
+            <a:pPr algn="ctr"/>
+            <a:r>
+              <a:rPr lang="en-US" sz="1400" dirty="0" smtClean="0"/>
+              <a:t>c1</a:t>
+            </a:r>
+            <a:endParaRPr lang="en-US" sz="1400" dirty="0"/>
+          </a:p>
+        </p:txBody>
+      </p:sp>
+      <p:sp>
+        <p:nvSpPr>
+          <p:cNvPr id="17" name="Flowchart: Connector 16"/>
+          <p:cNvSpPr/>
+          <p:nvPr/>
+        </p:nvSpPr>
+        <p:spPr>
+          <a:xfrm>
+            <a:off x="6255828" y="5634063"/>
+            <a:ext cx="914400" cy="914400"/>
+          </a:xfrm>
+          <a:prstGeom prst="flowChartConnector">
+            <a:avLst/>
+          </a:prstGeom>
+        </p:spPr>
+        <p:style>
+          <a:lnRef idx="1">
+            <a:schemeClr val="accent4"/>
+          </a:lnRef>
+          <a:fillRef idx="2">
+            <a:schemeClr val="accent4"/>
+          </a:fillRef>
+          <a:effectRef idx="1">
+            <a:schemeClr val="accent4"/>
+          </a:effectRef>
+          <a:fontRef idx="minor">
+            <a:schemeClr val="dk1"/>
+          </a:fontRef>
+        </p:style>
+        <p:txBody>
+          <a:bodyPr rtlCol="0" anchor="ctr"/>
+          <a:lstStyle/>
+          <a:p>
+            <a:pPr algn="ctr"/>
+            <a:r>
+              <a:rPr lang="en-US" sz="1400" dirty="0" smtClean="0"/>
+              <a:t>c6</a:t>
+            </a:r>
+            <a:endParaRPr lang="en-US" sz="1400" dirty="0"/>
+          </a:p>
+        </p:txBody>
+      </p:sp>
+      <p:sp>
+        <p:nvSpPr>
+          <p:cNvPr id="18" name="Flowchart: Connector 17"/>
+          <p:cNvSpPr/>
+          <p:nvPr/>
+        </p:nvSpPr>
+        <p:spPr>
+          <a:xfrm>
+            <a:off x="4910766" y="5184119"/>
+            <a:ext cx="914400" cy="914400"/>
+          </a:xfrm>
+          <a:prstGeom prst="flowChartConnector">
+            <a:avLst/>
+          </a:prstGeom>
+        </p:spPr>
+        <p:style>
+          <a:lnRef idx="1">
+            <a:schemeClr val="accent4"/>
+          </a:lnRef>
+          <a:fillRef idx="2">
+            <a:schemeClr val="accent4"/>
+          </a:fillRef>
+          <a:effectRef idx="1">
+            <a:schemeClr val="accent4"/>
+          </a:effectRef>
+          <a:fontRef idx="minor">
+            <a:schemeClr val="dk1"/>
+          </a:fontRef>
+        </p:style>
+        <p:txBody>
+          <a:bodyPr rtlCol="0" anchor="ctr"/>
+          <a:lstStyle/>
+          <a:p>
+            <a:pPr algn="ctr"/>
+            <a:r>
+              <a:rPr lang="en-US" sz="1400" dirty="0" smtClean="0"/>
+              <a:t>c4</a:t>
+            </a:r>
+            <a:endParaRPr lang="en-US" sz="1400" dirty="0"/>
+          </a:p>
+        </p:txBody>
+      </p:sp>
+      <p:sp>
+        <p:nvSpPr>
+          <p:cNvPr id="19" name="Flowchart: Connector 18"/>
+          <p:cNvSpPr/>
+          <p:nvPr/>
+        </p:nvSpPr>
+        <p:spPr>
+          <a:xfrm>
+            <a:off x="6090670" y="1927709"/>
+            <a:ext cx="914400" cy="914400"/>
+          </a:xfrm>
+          <a:prstGeom prst="flowChartConnector">
+            <a:avLst/>
+          </a:prstGeom>
+        </p:spPr>
+        <p:style>
+          <a:lnRef idx="2">
+            <a:schemeClr val="accent1">
+              <a:shade val="50000"/>
+            </a:schemeClr>
+          </a:lnRef>
+          <a:fillRef idx="1">
+            <a:schemeClr val="accent1"/>
+          </a:fillRef>
+          <a:effectRef idx="0">
+            <a:schemeClr val="accent1"/>
+          </a:effectRef>
+          <a:fontRef idx="minor">
+            <a:schemeClr val="lt1"/>
+          </a:fontRef>
+        </p:style>
+        <p:txBody>
+          <a:bodyPr rtlCol="0" anchor="ctr"/>
+          <a:lstStyle/>
+          <a:p>
+            <a:pPr algn="ctr"/>
+            <a:r>
+              <a:rPr lang="en-US" sz="1400" dirty="0" smtClean="0"/>
+              <a:t>d3</a:t>
+            </a:r>
+          </a:p>
+        </p:txBody>
+      </p:sp>
+      <p:sp>
+        <p:nvSpPr>
+          <p:cNvPr id="20" name="Flowchart: Connector 19"/>
+          <p:cNvSpPr/>
+          <p:nvPr/>
+        </p:nvSpPr>
+        <p:spPr>
+          <a:xfrm>
+            <a:off x="2380406" y="5880962"/>
+            <a:ext cx="914400" cy="914400"/>
+          </a:xfrm>
+          <a:prstGeom prst="flowChartConnector">
+            <a:avLst/>
+          </a:prstGeom>
+        </p:spPr>
+        <p:style>
+          <a:lnRef idx="2">
+            <a:schemeClr val="accent1">
+              <a:shade val="50000"/>
+            </a:schemeClr>
+          </a:lnRef>
+          <a:fillRef idx="1">
+            <a:schemeClr val="accent1"/>
+          </a:fillRef>
+          <a:effectRef idx="0">
+            <a:schemeClr val="accent1"/>
+          </a:effectRef>
+          <a:fontRef idx="minor">
+            <a:schemeClr val="lt1"/>
+          </a:fontRef>
+        </p:style>
+        <p:txBody>
+          <a:bodyPr rtlCol="0" anchor="ctr"/>
+          <a:lstStyle/>
+          <a:p>
+            <a:pPr algn="ctr"/>
+            <a:r>
+              <a:rPr lang="en-US" sz="1400" dirty="0" smtClean="0"/>
+              <a:t>d8</a:t>
+            </a:r>
+            <a:endParaRPr lang="en-US" sz="1400" dirty="0"/>
+          </a:p>
+        </p:txBody>
+      </p:sp>
+      <p:cxnSp>
+        <p:nvCxnSpPr>
+          <p:cNvPr id="22" name="Straight Arrow Connector 21"/>
+          <p:cNvCxnSpPr>
+            <a:stCxn id="5" idx="6"/>
+            <a:endCxn id="7" idx="2"/>
+          </p:cNvCxnSpPr>
+          <p:nvPr/>
+        </p:nvCxnSpPr>
+        <p:spPr>
+          <a:xfrm>
+            <a:off x="3674195" y="603055"/>
+            <a:ext cx="2581633" cy="69928"/>
+          </a:xfrm>
+          <a:prstGeom prst="straightConnector1">
+            <a:avLst/>
+          </a:prstGeom>
+          <a:ln>
+            <a:tailEnd type="triangle"/>
+          </a:ln>
+        </p:spPr>
+        <p:style>
+          <a:lnRef idx="1">
+            <a:schemeClr val="accent1"/>
+          </a:lnRef>
+          <a:fillRef idx="0">
+            <a:schemeClr val="accent1"/>
+          </a:fillRef>
+          <a:effectRef idx="0">
+            <a:schemeClr val="accent1"/>
+          </a:effectRef>
+          <a:fontRef idx="minor">
+            <a:schemeClr val="tx1"/>
+          </a:fontRef>
+        </p:style>
+      </p:cxnSp>
+      <p:cxnSp>
+        <p:nvCxnSpPr>
+          <p:cNvPr id="26" name="Straight Arrow Connector 25"/>
+          <p:cNvCxnSpPr>
+            <a:stCxn id="5" idx="4"/>
+            <a:endCxn id="6" idx="0"/>
+          </p:cNvCxnSpPr>
+          <p:nvPr/>
+        </p:nvCxnSpPr>
+        <p:spPr>
+          <a:xfrm flipH="1" flipV="1">
+            <a:off x="896616" y="440141"/>
+            <a:ext cx="2320379" cy="620114"/>
+          </a:xfrm>
+          <a:prstGeom prst="straightConnector1">
+            <a:avLst/>
+          </a:prstGeom>
+          <a:ln>
+            <a:tailEnd type="triangle"/>
+          </a:ln>
+        </p:spPr>
+        <p:style>
+          <a:lnRef idx="1">
+            <a:schemeClr val="accent1"/>
+          </a:lnRef>
+          <a:fillRef idx="0">
+            <a:schemeClr val="accent1"/>
+          </a:fillRef>
+          <a:effectRef idx="0">
+            <a:schemeClr val="accent1"/>
+          </a:effectRef>
+          <a:fontRef idx="minor">
+            <a:schemeClr val="tx1"/>
+          </a:fontRef>
+        </p:style>
+      </p:cxnSp>
+      <p:cxnSp>
+        <p:nvCxnSpPr>
+          <p:cNvPr id="28" name="Straight Arrow Connector 27"/>
+          <p:cNvCxnSpPr>
+            <a:stCxn id="6" idx="5"/>
+            <a:endCxn id="10" idx="1"/>
+          </p:cNvCxnSpPr>
+          <p:nvPr/>
+        </p:nvCxnSpPr>
+        <p:spPr>
+          <a:xfrm>
+            <a:off x="1219905" y="1220630"/>
+            <a:ext cx="3585946" cy="1986122"/>
+          </a:xfrm>
+          <a:prstGeom prst="straightConnector1">
+            <a:avLst/>
+          </a:prstGeom>
+          <a:ln>
+            <a:tailEnd type="triangle"/>
+          </a:ln>
+        </p:spPr>
+        <p:style>
+          <a:lnRef idx="1">
+            <a:schemeClr val="accent1"/>
+          </a:lnRef>
+          <a:fillRef idx="0">
+            <a:schemeClr val="accent1"/>
+          </a:fillRef>
+          <a:effectRef idx="0">
+            <a:schemeClr val="accent1"/>
+          </a:effectRef>
+          <a:fontRef idx="minor">
+            <a:schemeClr val="tx1"/>
+          </a:fontRef>
+        </p:style>
+      </p:cxnSp>
+      <p:cxnSp>
+        <p:nvCxnSpPr>
+          <p:cNvPr id="30" name="Straight Arrow Connector 29"/>
+          <p:cNvCxnSpPr>
+            <a:stCxn id="19" idx="4"/>
+            <a:endCxn id="10" idx="7"/>
+          </p:cNvCxnSpPr>
+          <p:nvPr/>
+        </p:nvCxnSpPr>
+        <p:spPr>
+          <a:xfrm flipH="1">
+            <a:off x="5452429" y="2842109"/>
+            <a:ext cx="1095441" cy="364643"/>
+          </a:xfrm>
+          <a:prstGeom prst="straightConnector1">
+            <a:avLst/>
+          </a:prstGeom>
+          <a:ln>
+            <a:tailEnd type="triangle"/>
+          </a:ln>
+        </p:spPr>
+        <p:style>
+          <a:lnRef idx="1">
+            <a:schemeClr val="accent1"/>
+          </a:lnRef>
+          <a:fillRef idx="0">
+            <a:schemeClr val="accent1"/>
+          </a:fillRef>
+          <a:effectRef idx="0">
+            <a:schemeClr val="accent1"/>
+          </a:effectRef>
+          <a:fontRef idx="minor">
+            <a:schemeClr val="tx1"/>
+          </a:fontRef>
+        </p:style>
+      </p:cxnSp>
+      <p:cxnSp>
+        <p:nvCxnSpPr>
+          <p:cNvPr id="32" name="Straight Arrow Connector 31"/>
+          <p:cNvCxnSpPr>
+            <a:stCxn id="19" idx="5"/>
+            <a:endCxn id="12" idx="0"/>
+          </p:cNvCxnSpPr>
+          <p:nvPr/>
+        </p:nvCxnSpPr>
+        <p:spPr>
+          <a:xfrm>
+            <a:off x="6871159" y="2708198"/>
+            <a:ext cx="1426582" cy="1885544"/>
+          </a:xfrm>
+          <a:prstGeom prst="straightConnector1">
+            <a:avLst/>
+          </a:prstGeom>
+          <a:ln>
+            <a:tailEnd type="triangle"/>
+          </a:ln>
+        </p:spPr>
+        <p:style>
+          <a:lnRef idx="1">
+            <a:schemeClr val="accent1"/>
+          </a:lnRef>
+          <a:fillRef idx="0">
+            <a:schemeClr val="accent1"/>
+          </a:fillRef>
+          <a:effectRef idx="0">
+            <a:schemeClr val="accent1"/>
+          </a:effectRef>
+          <a:fontRef idx="minor">
+            <a:schemeClr val="tx1"/>
+          </a:fontRef>
+        </p:style>
+      </p:cxnSp>
+      <p:cxnSp>
+        <p:nvCxnSpPr>
+          <p:cNvPr id="34" name="Straight Arrow Connector 33"/>
+          <p:cNvCxnSpPr>
+            <a:stCxn id="7" idx="4"/>
+            <a:endCxn id="19" idx="0"/>
+          </p:cNvCxnSpPr>
+          <p:nvPr/>
+        </p:nvCxnSpPr>
+        <p:spPr>
+          <a:xfrm flipH="1">
+            <a:off x="6547870" y="1130183"/>
+            <a:ext cx="165158" cy="797526"/>
+          </a:xfrm>
+          <a:prstGeom prst="straightConnector1">
+            <a:avLst/>
+          </a:prstGeom>
+          <a:ln>
+            <a:tailEnd type="triangle"/>
+          </a:ln>
+        </p:spPr>
+        <p:style>
+          <a:lnRef idx="1">
+            <a:schemeClr val="accent1"/>
+          </a:lnRef>
+          <a:fillRef idx="0">
+            <a:schemeClr val="accent1"/>
+          </a:fillRef>
+          <a:effectRef idx="0">
+            <a:schemeClr val="accent1"/>
+          </a:effectRef>
+          <a:fontRef idx="minor">
+            <a:schemeClr val="tx1"/>
+          </a:fontRef>
+        </p:style>
+      </p:cxnSp>
+      <p:cxnSp>
+        <p:nvCxnSpPr>
+          <p:cNvPr id="36" name="Straight Arrow Connector 35"/>
+          <p:cNvCxnSpPr>
+            <a:stCxn id="10" idx="3"/>
+            <a:endCxn id="8" idx="7"/>
+          </p:cNvCxnSpPr>
+          <p:nvPr/>
+        </p:nvCxnSpPr>
+        <p:spPr>
+          <a:xfrm flipH="1" flipV="1">
+            <a:off x="1679194" y="3224789"/>
+            <a:ext cx="3126657" cy="628541"/>
+          </a:xfrm>
+          <a:prstGeom prst="straightConnector1">
+            <a:avLst/>
+          </a:prstGeom>
+          <a:ln>
+            <a:tailEnd type="triangle"/>
+          </a:ln>
+        </p:spPr>
+        <p:style>
+          <a:lnRef idx="1">
+            <a:schemeClr val="accent1"/>
+          </a:lnRef>
+          <a:fillRef idx="0">
+            <a:schemeClr val="accent1"/>
+          </a:fillRef>
+          <a:effectRef idx="0">
+            <a:schemeClr val="accent1"/>
+          </a:effectRef>
+          <a:fontRef idx="minor">
+            <a:schemeClr val="tx1"/>
+          </a:fontRef>
+        </p:style>
+      </p:cxnSp>
+      <p:cxnSp>
+        <p:nvCxnSpPr>
+          <p:cNvPr id="38" name="Straight Arrow Connector 37"/>
+          <p:cNvCxnSpPr>
+            <a:stCxn id="6" idx="4"/>
+            <a:endCxn id="8" idx="0"/>
+          </p:cNvCxnSpPr>
+          <p:nvPr/>
+        </p:nvCxnSpPr>
+        <p:spPr>
+          <a:xfrm>
+            <a:off x="896616" y="1354541"/>
+            <a:ext cx="459289" cy="1736337"/>
+          </a:xfrm>
+          <a:prstGeom prst="straightConnector1">
+            <a:avLst/>
+          </a:prstGeom>
+          <a:ln>
+            <a:tailEnd type="triangle"/>
+          </a:ln>
+        </p:spPr>
+        <p:style>
+          <a:lnRef idx="1">
+            <a:schemeClr val="accent1"/>
+          </a:lnRef>
+          <a:fillRef idx="0">
+            <a:schemeClr val="accent1"/>
+          </a:fillRef>
+          <a:effectRef idx="0">
+            <a:schemeClr val="accent1"/>
+          </a:effectRef>
+          <a:fontRef idx="minor">
+            <a:schemeClr val="tx1"/>
+          </a:fontRef>
+        </p:style>
+      </p:cxnSp>
+      <p:cxnSp>
+        <p:nvCxnSpPr>
+          <p:cNvPr id="42" name="Straight Arrow Connector 41"/>
+          <p:cNvCxnSpPr>
+            <a:stCxn id="8" idx="4"/>
+            <a:endCxn id="4" idx="1"/>
+          </p:cNvCxnSpPr>
+          <p:nvPr/>
+        </p:nvCxnSpPr>
+        <p:spPr>
+          <a:xfrm flipH="1">
+            <a:off x="948153" y="4005278"/>
+            <a:ext cx="407752" cy="1552395"/>
+          </a:xfrm>
+          <a:prstGeom prst="straightConnector1">
+            <a:avLst/>
+          </a:prstGeom>
+          <a:ln>
+            <a:tailEnd type="triangle"/>
+          </a:ln>
+        </p:spPr>
+        <p:style>
+          <a:lnRef idx="1">
+            <a:schemeClr val="accent1"/>
+          </a:lnRef>
+          <a:fillRef idx="0">
+            <a:schemeClr val="accent1"/>
+          </a:fillRef>
+          <a:effectRef idx="0">
+            <a:schemeClr val="accent1"/>
+          </a:effectRef>
+          <a:fontRef idx="minor">
+            <a:schemeClr val="tx1"/>
+          </a:fontRef>
+        </p:style>
+      </p:cxnSp>
+      <p:cxnSp>
+        <p:nvCxnSpPr>
+          <p:cNvPr id="44" name="Straight Arrow Connector 43"/>
+          <p:cNvCxnSpPr>
+            <a:stCxn id="8" idx="5"/>
+            <a:endCxn id="20" idx="1"/>
+          </p:cNvCxnSpPr>
+          <p:nvPr/>
+        </p:nvCxnSpPr>
+        <p:spPr>
+          <a:xfrm>
+            <a:off x="1679194" y="3871367"/>
+            <a:ext cx="835123" cy="2143506"/>
+          </a:xfrm>
+          <a:prstGeom prst="straightConnector1">
+            <a:avLst/>
+          </a:prstGeom>
+          <a:ln>
+            <a:tailEnd type="triangle"/>
+          </a:ln>
+        </p:spPr>
+        <p:style>
+          <a:lnRef idx="1">
+            <a:schemeClr val="accent1"/>
+          </a:lnRef>
+          <a:fillRef idx="0">
+            <a:schemeClr val="accent1"/>
+          </a:fillRef>
+          <a:effectRef idx="0">
+            <a:schemeClr val="accent1"/>
+          </a:effectRef>
+          <a:fontRef idx="minor">
+            <a:schemeClr val="tx1"/>
+          </a:fontRef>
+        </p:style>
+      </p:cxnSp>
+      <p:cxnSp>
+        <p:nvCxnSpPr>
+          <p:cNvPr id="46" name="Straight Arrow Connector 45"/>
+          <p:cNvCxnSpPr>
+            <a:stCxn id="12" idx="2"/>
+            <a:endCxn id="8" idx="6"/>
+          </p:cNvCxnSpPr>
+          <p:nvPr/>
+        </p:nvCxnSpPr>
+        <p:spPr>
+          <a:xfrm flipH="1" flipV="1">
+            <a:off x="1813105" y="3548078"/>
+            <a:ext cx="6027436" cy="1502864"/>
+          </a:xfrm>
+          <a:prstGeom prst="straightConnector1">
+            <a:avLst/>
+          </a:prstGeom>
+          <a:ln>
+            <a:tailEnd type="triangle"/>
+          </a:ln>
+        </p:spPr>
+        <p:style>
+          <a:lnRef idx="1">
+            <a:schemeClr val="accent1"/>
+          </a:lnRef>
+          <a:fillRef idx="0">
+            <a:schemeClr val="accent1"/>
+          </a:fillRef>
+          <a:effectRef idx="0">
+            <a:schemeClr val="accent1"/>
+          </a:effectRef>
+          <a:fontRef idx="minor">
+            <a:schemeClr val="tx1"/>
+          </a:fontRef>
+        </p:style>
+      </p:cxnSp>
+      <p:cxnSp>
+        <p:nvCxnSpPr>
+          <p:cNvPr id="48" name="Straight Arrow Connector 47"/>
+          <p:cNvCxnSpPr>
+            <a:stCxn id="10" idx="4"/>
+            <a:endCxn id="20" idx="0"/>
+          </p:cNvCxnSpPr>
+          <p:nvPr/>
+        </p:nvCxnSpPr>
+        <p:spPr>
+          <a:xfrm flipH="1">
+            <a:off x="2837606" y="3987241"/>
+            <a:ext cx="2291534" cy="1893721"/>
+          </a:xfrm>
+          <a:prstGeom prst="straightConnector1">
+            <a:avLst/>
+          </a:prstGeom>
+          <a:ln>
+            <a:tailEnd type="triangle"/>
+          </a:ln>
+        </p:spPr>
+        <p:style>
+          <a:lnRef idx="1">
+            <a:schemeClr val="accent1"/>
+          </a:lnRef>
+          <a:fillRef idx="0">
+            <a:schemeClr val="accent1"/>
+          </a:fillRef>
+          <a:effectRef idx="0">
+            <a:schemeClr val="accent1"/>
+          </a:effectRef>
+          <a:fontRef idx="minor">
+            <a:schemeClr val="tx1"/>
+          </a:fontRef>
+        </p:style>
+      </p:cxnSp>
+      <p:cxnSp>
+        <p:nvCxnSpPr>
+          <p:cNvPr id="50" name="Straight Arrow Connector 49"/>
+          <p:cNvCxnSpPr>
+            <a:stCxn id="4" idx="6"/>
+            <a:endCxn id="20" idx="2"/>
+          </p:cNvCxnSpPr>
+          <p:nvPr/>
+        </p:nvCxnSpPr>
+        <p:spPr>
+          <a:xfrm>
+            <a:off x="1728642" y="5880962"/>
+            <a:ext cx="651764" cy="457200"/>
+          </a:xfrm>
+          <a:prstGeom prst="straightConnector1">
+            <a:avLst/>
+          </a:prstGeom>
+          <a:ln>
+            <a:tailEnd type="triangle"/>
+          </a:ln>
+        </p:spPr>
+        <p:style>
+          <a:lnRef idx="1">
+            <a:schemeClr val="accent1"/>
+          </a:lnRef>
+          <a:fillRef idx="0">
+            <a:schemeClr val="accent1"/>
+          </a:fillRef>
+          <a:effectRef idx="0">
+            <a:schemeClr val="accent1"/>
+          </a:effectRef>
+          <a:fontRef idx="minor">
+            <a:schemeClr val="tx1"/>
+          </a:fontRef>
+        </p:style>
+      </p:cxnSp>
+      <p:cxnSp>
+        <p:nvCxnSpPr>
+          <p:cNvPr id="52" name="Straight Arrow Connector 51"/>
+          <p:cNvCxnSpPr>
+            <a:stCxn id="19" idx="3"/>
+            <a:endCxn id="4" idx="0"/>
+          </p:cNvCxnSpPr>
+          <p:nvPr/>
+        </p:nvCxnSpPr>
+        <p:spPr>
+          <a:xfrm flipH="1">
+            <a:off x="1271442" y="2708198"/>
+            <a:ext cx="4953139" cy="2715564"/>
+          </a:xfrm>
+          <a:prstGeom prst="straightConnector1">
+            <a:avLst/>
+          </a:prstGeom>
+          <a:ln>
+            <a:tailEnd type="triangle"/>
+          </a:ln>
+        </p:spPr>
+        <p:style>
+          <a:lnRef idx="1">
+            <a:schemeClr val="accent1"/>
+          </a:lnRef>
+          <a:fillRef idx="0">
+            <a:schemeClr val="accent1"/>
+          </a:fillRef>
+          <a:effectRef idx="0">
+            <a:schemeClr val="accent1"/>
+          </a:effectRef>
+          <a:fontRef idx="minor">
+            <a:schemeClr val="tx1"/>
+          </a:fontRef>
+        </p:style>
+      </p:cxnSp>
+      <p:cxnSp>
+        <p:nvCxnSpPr>
+          <p:cNvPr id="54" name="Straight Arrow Connector 53"/>
+          <p:cNvCxnSpPr>
+            <a:stCxn id="7" idx="5"/>
+            <a:endCxn id="12" idx="7"/>
+          </p:cNvCxnSpPr>
+          <p:nvPr/>
+        </p:nvCxnSpPr>
+        <p:spPr>
+          <a:xfrm>
+            <a:off x="7036317" y="996272"/>
+            <a:ext cx="1584713" cy="3731381"/>
+          </a:xfrm>
+          <a:prstGeom prst="straightConnector1">
+            <a:avLst/>
+          </a:prstGeom>
+          <a:ln>
+            <a:tailEnd type="triangle"/>
+          </a:ln>
+        </p:spPr>
+        <p:style>
+          <a:lnRef idx="1">
+            <a:schemeClr val="accent1"/>
+          </a:lnRef>
+          <a:fillRef idx="0">
+            <a:schemeClr val="accent1"/>
+          </a:fillRef>
+          <a:effectRef idx="0">
+            <a:schemeClr val="accent1"/>
+          </a:effectRef>
+          <a:fontRef idx="minor">
+            <a:schemeClr val="tx1"/>
+          </a:fontRef>
+        </p:style>
+      </p:cxnSp>
+      <p:cxnSp>
+        <p:nvCxnSpPr>
+          <p:cNvPr id="56" name="Straight Arrow Connector 55"/>
+          <p:cNvCxnSpPr>
+            <a:stCxn id="7" idx="3"/>
+            <a:endCxn id="6" idx="7"/>
+          </p:cNvCxnSpPr>
+          <p:nvPr/>
+        </p:nvCxnSpPr>
+        <p:spPr>
+          <a:xfrm flipH="1" flipV="1">
+            <a:off x="1219905" y="574052"/>
+            <a:ext cx="5169834" cy="422220"/>
+          </a:xfrm>
+          <a:prstGeom prst="straightConnector1">
+            <a:avLst/>
+          </a:prstGeom>
+          <a:ln>
+            <a:tailEnd type="triangle"/>
+          </a:ln>
+        </p:spPr>
+        <p:style>
+          <a:lnRef idx="1">
+            <a:schemeClr val="accent1"/>
+          </a:lnRef>
+          <a:fillRef idx="0">
+            <a:schemeClr val="accent1"/>
+          </a:fillRef>
+          <a:effectRef idx="0">
+            <a:schemeClr val="accent1"/>
+          </a:effectRef>
+          <a:fontRef idx="minor">
+            <a:schemeClr val="tx1"/>
+          </a:fontRef>
+        </p:style>
+      </p:cxnSp>
+      <p:cxnSp>
+        <p:nvCxnSpPr>
+          <p:cNvPr id="58" name="Straight Arrow Connector 57"/>
+          <p:cNvCxnSpPr>
+            <a:stCxn id="6" idx="6"/>
+            <a:endCxn id="19" idx="2"/>
+          </p:cNvCxnSpPr>
+          <p:nvPr/>
+        </p:nvCxnSpPr>
+        <p:spPr>
+          <a:xfrm>
+            <a:off x="1353816" y="897341"/>
+            <a:ext cx="4736854" cy="1487568"/>
+          </a:xfrm>
+          <a:prstGeom prst="straightConnector1">
+            <a:avLst/>
+          </a:prstGeom>
+          <a:ln>
+            <a:tailEnd type="triangle"/>
+          </a:ln>
+        </p:spPr>
+        <p:style>
+          <a:lnRef idx="1">
+            <a:schemeClr val="accent1"/>
+          </a:lnRef>
+          <a:fillRef idx="0">
+            <a:schemeClr val="accent1"/>
+          </a:fillRef>
+          <a:effectRef idx="0">
+            <a:schemeClr val="accent1"/>
+          </a:effectRef>
+          <a:fontRef idx="minor">
+            <a:schemeClr val="tx1"/>
+          </a:fontRef>
+        </p:style>
+      </p:cxnSp>
+      <p:cxnSp>
+        <p:nvCxnSpPr>
+          <p:cNvPr id="60" name="Straight Arrow Connector 59"/>
+          <p:cNvCxnSpPr>
+            <a:stCxn id="5" idx="5"/>
+            <a:endCxn id="10" idx="0"/>
+          </p:cNvCxnSpPr>
+          <p:nvPr/>
+        </p:nvCxnSpPr>
+        <p:spPr>
+          <a:xfrm>
+            <a:off x="3540284" y="926344"/>
+            <a:ext cx="1588856" cy="2146497"/>
+          </a:xfrm>
+          <a:prstGeom prst="straightConnector1">
+            <a:avLst/>
+          </a:prstGeom>
+          <a:ln>
+            <a:tailEnd type="triangle"/>
+          </a:ln>
+        </p:spPr>
+        <p:style>
+          <a:lnRef idx="1">
+            <a:schemeClr val="accent1"/>
+          </a:lnRef>
+          <a:fillRef idx="0">
+            <a:schemeClr val="accent1"/>
+          </a:fillRef>
+          <a:effectRef idx="0">
+            <a:schemeClr val="accent1"/>
+          </a:effectRef>
+          <a:fontRef idx="minor">
+            <a:schemeClr val="tx1"/>
+          </a:fontRef>
+        </p:style>
+      </p:cxnSp>
+      <p:cxnSp>
+        <p:nvCxnSpPr>
+          <p:cNvPr id="62" name="Straight Arrow Connector 61"/>
+          <p:cNvCxnSpPr>
+            <a:stCxn id="10" idx="5"/>
+            <a:endCxn id="12" idx="1"/>
+          </p:cNvCxnSpPr>
+          <p:nvPr/>
+        </p:nvCxnSpPr>
+        <p:spPr>
+          <a:xfrm>
+            <a:off x="5452429" y="3853330"/>
+            <a:ext cx="2522023" cy="874323"/>
+          </a:xfrm>
+          <a:prstGeom prst="straightConnector1">
+            <a:avLst/>
+          </a:prstGeom>
+          <a:ln>
+            <a:tailEnd type="triangle"/>
+          </a:ln>
+        </p:spPr>
+        <p:style>
+          <a:lnRef idx="1">
+            <a:schemeClr val="accent1"/>
+          </a:lnRef>
+          <a:fillRef idx="0">
+            <a:schemeClr val="accent1"/>
+          </a:fillRef>
+          <a:effectRef idx="0">
+            <a:schemeClr val="accent1"/>
+          </a:effectRef>
+          <a:fontRef idx="minor">
+            <a:schemeClr val="tx1"/>
+          </a:fontRef>
+        </p:style>
+      </p:cxnSp>
+      <p:cxnSp>
+        <p:nvCxnSpPr>
+          <p:cNvPr id="64" name="Straight Arrow Connector 63"/>
+          <p:cNvCxnSpPr>
+            <a:stCxn id="12" idx="3"/>
+            <a:endCxn id="4" idx="7"/>
+          </p:cNvCxnSpPr>
+          <p:nvPr/>
+        </p:nvCxnSpPr>
+        <p:spPr>
+          <a:xfrm flipH="1">
+            <a:off x="1594731" y="5374231"/>
+            <a:ext cx="6379721" cy="183442"/>
+          </a:xfrm>
+          <a:prstGeom prst="straightConnector1">
+            <a:avLst/>
+          </a:prstGeom>
+          <a:ln>
+            <a:tailEnd type="triangle"/>
+          </a:ln>
+        </p:spPr>
+        <p:style>
+          <a:lnRef idx="1">
+            <a:schemeClr val="accent1"/>
+          </a:lnRef>
+          <a:fillRef idx="0">
+            <a:schemeClr val="accent1"/>
+          </a:fillRef>
+          <a:effectRef idx="0">
+            <a:schemeClr val="accent1"/>
+          </a:effectRef>
+          <a:fontRef idx="minor">
+            <a:schemeClr val="tx1"/>
+          </a:fontRef>
+        </p:style>
+      </p:cxnSp>
+      <p:cxnSp>
+        <p:nvCxnSpPr>
+          <p:cNvPr id="106" name="Straight Arrow Connector 105"/>
+          <p:cNvCxnSpPr>
+            <a:stCxn id="7" idx="6"/>
+            <a:endCxn id="14" idx="2"/>
+          </p:cNvCxnSpPr>
+          <p:nvPr/>
+        </p:nvCxnSpPr>
+        <p:spPr>
+          <a:xfrm flipH="1">
+            <a:off x="3133319" y="672983"/>
+            <a:ext cx="4036909" cy="1156806"/>
+          </a:xfrm>
+          <a:prstGeom prst="straightConnector1">
+            <a:avLst/>
+          </a:prstGeom>
+          <a:ln>
+            <a:tailEnd type="triangle"/>
+          </a:ln>
+        </p:spPr>
+        <p:style>
+          <a:lnRef idx="3">
+            <a:schemeClr val="accent4"/>
+          </a:lnRef>
+          <a:fillRef idx="0">
+            <a:schemeClr val="accent4"/>
+          </a:fillRef>
+          <a:effectRef idx="2">
+            <a:schemeClr val="accent4"/>
+          </a:effectRef>
+          <a:fontRef idx="minor">
+            <a:schemeClr val="tx1"/>
+          </a:fontRef>
+        </p:style>
+      </p:cxnSp>
+      <p:cxnSp>
+        <p:nvCxnSpPr>
+          <p:cNvPr id="108" name="Straight Arrow Connector 107"/>
+          <p:cNvCxnSpPr>
+            <a:stCxn id="19" idx="6"/>
+            <a:endCxn id="14" idx="2"/>
+          </p:cNvCxnSpPr>
+          <p:nvPr/>
+        </p:nvCxnSpPr>
+        <p:spPr>
+          <a:xfrm flipH="1" flipV="1">
+            <a:off x="3133319" y="1829789"/>
+            <a:ext cx="3871751" cy="555120"/>
+          </a:xfrm>
+          <a:prstGeom prst="straightConnector1">
+            <a:avLst/>
+          </a:prstGeom>
+          <a:ln>
+            <a:tailEnd type="triangle"/>
+          </a:ln>
+        </p:spPr>
+        <p:style>
+          <a:lnRef idx="3">
+            <a:schemeClr val="accent4"/>
+          </a:lnRef>
+          <a:fillRef idx="0">
+            <a:schemeClr val="accent4"/>
+          </a:fillRef>
+          <a:effectRef idx="2">
+            <a:schemeClr val="accent4"/>
+          </a:effectRef>
+          <a:fontRef idx="minor">
+            <a:schemeClr val="tx1"/>
+          </a:fontRef>
+        </p:style>
+      </p:cxnSp>
+      <p:cxnSp>
+        <p:nvCxnSpPr>
+          <p:cNvPr id="110" name="Straight Arrow Connector 109"/>
+          <p:cNvCxnSpPr>
+            <a:stCxn id="19" idx="6"/>
+            <a:endCxn id="16" idx="2"/>
+          </p:cNvCxnSpPr>
+          <p:nvPr/>
+        </p:nvCxnSpPr>
+        <p:spPr>
+          <a:xfrm flipV="1">
+            <a:off x="7005070" y="1309692"/>
+            <a:ext cx="2124433" cy="1075217"/>
+          </a:xfrm>
+          <a:prstGeom prst="straightConnector1">
+            <a:avLst/>
+          </a:prstGeom>
+          <a:ln>
+            <a:tailEnd type="triangle"/>
+          </a:ln>
+        </p:spPr>
+        <p:style>
+          <a:lnRef idx="3">
+            <a:schemeClr val="accent4"/>
+          </a:lnRef>
+          <a:fillRef idx="0">
+            <a:schemeClr val="accent4"/>
+          </a:fillRef>
+          <a:effectRef idx="2">
+            <a:schemeClr val="accent4"/>
+          </a:effectRef>
+          <a:fontRef idx="minor">
+            <a:schemeClr val="tx1"/>
+          </a:fontRef>
+        </p:style>
+      </p:cxnSp>
+      <p:cxnSp>
+        <p:nvCxnSpPr>
+          <p:cNvPr id="112" name="Straight Arrow Connector 111"/>
+          <p:cNvCxnSpPr>
+            <a:stCxn id="19" idx="6"/>
+            <a:endCxn id="15" idx="2"/>
+          </p:cNvCxnSpPr>
+          <p:nvPr/>
+        </p:nvCxnSpPr>
+        <p:spPr>
+          <a:xfrm flipH="1">
+            <a:off x="2621996" y="2384909"/>
+            <a:ext cx="4383074" cy="368271"/>
+          </a:xfrm>
+          <a:prstGeom prst="straightConnector1">
+            <a:avLst/>
+          </a:prstGeom>
+          <a:ln>
+            <a:tailEnd type="triangle"/>
+          </a:ln>
+        </p:spPr>
+        <p:style>
+          <a:lnRef idx="3">
+            <a:schemeClr val="accent4"/>
+          </a:lnRef>
+          <a:fillRef idx="0">
+            <a:schemeClr val="accent4"/>
+          </a:fillRef>
+          <a:effectRef idx="2">
+            <a:schemeClr val="accent4"/>
+          </a:effectRef>
+          <a:fontRef idx="minor">
+            <a:schemeClr val="tx1"/>
+          </a:fontRef>
+        </p:style>
+      </p:cxnSp>
+      <p:cxnSp>
+        <p:nvCxnSpPr>
+          <p:cNvPr id="114" name="Straight Arrow Connector 113"/>
+          <p:cNvCxnSpPr>
+            <a:stCxn id="6" idx="6"/>
+            <a:endCxn id="16" idx="2"/>
+          </p:cNvCxnSpPr>
+          <p:nvPr/>
+        </p:nvCxnSpPr>
+        <p:spPr>
+          <a:xfrm>
+            <a:off x="1353816" y="897341"/>
+            <a:ext cx="7775687" cy="412351"/>
+          </a:xfrm>
+          <a:prstGeom prst="straightConnector1">
+            <a:avLst/>
+          </a:prstGeom>
+          <a:ln>
+            <a:tailEnd type="triangle"/>
+          </a:ln>
+        </p:spPr>
+        <p:style>
+          <a:lnRef idx="3">
+            <a:schemeClr val="accent4"/>
+          </a:lnRef>
+          <a:fillRef idx="0">
+            <a:schemeClr val="accent4"/>
+          </a:fillRef>
+          <a:effectRef idx="2">
+            <a:schemeClr val="accent4"/>
+          </a:effectRef>
+          <a:fontRef idx="minor">
+            <a:schemeClr val="tx1"/>
+          </a:fontRef>
+        </p:style>
+      </p:cxnSp>
+      <p:cxnSp>
+        <p:nvCxnSpPr>
+          <p:cNvPr id="116" name="Straight Arrow Connector 115"/>
+          <p:cNvCxnSpPr>
+            <a:stCxn id="6" idx="6"/>
+            <a:endCxn id="14" idx="2"/>
+          </p:cNvCxnSpPr>
+          <p:nvPr/>
+        </p:nvCxnSpPr>
+        <p:spPr>
+          <a:xfrm>
+            <a:off x="1353816" y="897341"/>
+            <a:ext cx="1779503" cy="932448"/>
+          </a:xfrm>
+          <a:prstGeom prst="straightConnector1">
+            <a:avLst/>
+          </a:prstGeom>
+          <a:ln>
+            <a:tailEnd type="triangle"/>
+          </a:ln>
+        </p:spPr>
+        <p:style>
+          <a:lnRef idx="3">
+            <a:schemeClr val="accent4"/>
+          </a:lnRef>
+          <a:fillRef idx="0">
+            <a:schemeClr val="accent4"/>
+          </a:fillRef>
+          <a:effectRef idx="2">
+            <a:schemeClr val="accent4"/>
+          </a:effectRef>
+          <a:fontRef idx="minor">
+            <a:schemeClr val="tx1"/>
+          </a:fontRef>
+        </p:style>
+      </p:cxnSp>
+      <p:cxnSp>
+        <p:nvCxnSpPr>
+          <p:cNvPr id="118" name="Straight Arrow Connector 117"/>
+          <p:cNvCxnSpPr>
+            <a:stCxn id="12" idx="6"/>
+            <a:endCxn id="18" idx="2"/>
+          </p:cNvCxnSpPr>
+          <p:nvPr/>
+        </p:nvCxnSpPr>
+        <p:spPr>
+          <a:xfrm flipH="1">
+            <a:off x="4910766" y="5050942"/>
+            <a:ext cx="3844175" cy="590377"/>
+          </a:xfrm>
+          <a:prstGeom prst="straightConnector1">
+            <a:avLst/>
+          </a:prstGeom>
+          <a:ln>
+            <a:tailEnd type="triangle"/>
+          </a:ln>
+        </p:spPr>
+        <p:style>
+          <a:lnRef idx="3">
+            <a:schemeClr val="accent4"/>
+          </a:lnRef>
+          <a:fillRef idx="0">
+            <a:schemeClr val="accent4"/>
+          </a:fillRef>
+          <a:effectRef idx="2">
+            <a:schemeClr val="accent4"/>
+          </a:effectRef>
+          <a:fontRef idx="minor">
+            <a:schemeClr val="tx1"/>
+          </a:fontRef>
+        </p:style>
+      </p:cxnSp>
+      <p:cxnSp>
+        <p:nvCxnSpPr>
+          <p:cNvPr id="120" name="Straight Arrow Connector 119"/>
+          <p:cNvCxnSpPr>
+            <a:stCxn id="12" idx="6"/>
+            <a:endCxn id="11" idx="2"/>
+          </p:cNvCxnSpPr>
+          <p:nvPr/>
+        </p:nvCxnSpPr>
+        <p:spPr>
+          <a:xfrm flipH="1" flipV="1">
+            <a:off x="3948875" y="4894847"/>
+            <a:ext cx="4806066" cy="156095"/>
+          </a:xfrm>
+          <a:prstGeom prst="straightConnector1">
+            <a:avLst/>
+          </a:prstGeom>
+          <a:ln>
+            <a:tailEnd type="triangle"/>
+          </a:ln>
+        </p:spPr>
+        <p:style>
+          <a:lnRef idx="3">
+            <a:schemeClr val="accent4"/>
+          </a:lnRef>
+          <a:fillRef idx="0">
+            <a:schemeClr val="accent4"/>
+          </a:fillRef>
+          <a:effectRef idx="2">
+            <a:schemeClr val="accent4"/>
+          </a:effectRef>
+          <a:fontRef idx="minor">
+            <a:schemeClr val="tx1"/>
+          </a:fontRef>
+        </p:style>
+      </p:cxnSp>
+      <p:cxnSp>
+        <p:nvCxnSpPr>
+          <p:cNvPr id="122" name="Straight Arrow Connector 121"/>
+          <p:cNvCxnSpPr>
+            <a:stCxn id="12" idx="6"/>
+            <a:endCxn id="15" idx="2"/>
+          </p:cNvCxnSpPr>
+          <p:nvPr/>
+        </p:nvCxnSpPr>
+        <p:spPr>
+          <a:xfrm flipH="1" flipV="1">
+            <a:off x="2621996" y="2753180"/>
+            <a:ext cx="6132945" cy="2297762"/>
+          </a:xfrm>
+          <a:prstGeom prst="straightConnector1">
+            <a:avLst/>
+          </a:prstGeom>
+          <a:ln>
+            <a:tailEnd type="triangle"/>
+          </a:ln>
+        </p:spPr>
+        <p:style>
+          <a:lnRef idx="3">
+            <a:schemeClr val="accent4"/>
+          </a:lnRef>
+          <a:fillRef idx="0">
+            <a:schemeClr val="accent4"/>
+          </a:fillRef>
+          <a:effectRef idx="2">
+            <a:schemeClr val="accent4"/>
+          </a:effectRef>
+          <a:fontRef idx="minor">
+            <a:schemeClr val="tx1"/>
+          </a:fontRef>
+        </p:style>
+      </p:cxnSp>
+      <p:cxnSp>
+        <p:nvCxnSpPr>
+          <p:cNvPr id="124" name="Straight Arrow Connector 123"/>
+          <p:cNvCxnSpPr>
+            <a:stCxn id="12" idx="6"/>
+            <a:endCxn id="16" idx="2"/>
+          </p:cNvCxnSpPr>
+          <p:nvPr/>
+        </p:nvCxnSpPr>
+        <p:spPr>
+          <a:xfrm flipV="1">
+            <a:off x="8754941" y="1309692"/>
+            <a:ext cx="374562" cy="3741250"/>
+          </a:xfrm>
+          <a:prstGeom prst="straightConnector1">
+            <a:avLst/>
+          </a:prstGeom>
+          <a:ln>
+            <a:tailEnd type="triangle"/>
+          </a:ln>
+        </p:spPr>
+        <p:style>
+          <a:lnRef idx="3">
+            <a:schemeClr val="accent4"/>
+          </a:lnRef>
+          <a:fillRef idx="0">
+            <a:schemeClr val="accent4"/>
+          </a:fillRef>
+          <a:effectRef idx="2">
+            <a:schemeClr val="accent4"/>
+          </a:effectRef>
+          <a:fontRef idx="minor">
+            <a:schemeClr val="tx1"/>
+          </a:fontRef>
+        </p:style>
+      </p:cxnSp>
+      <p:cxnSp>
+        <p:nvCxnSpPr>
+          <p:cNvPr id="126" name="Straight Arrow Connector 125"/>
+          <p:cNvCxnSpPr>
+            <a:stCxn id="10" idx="6"/>
+            <a:endCxn id="11" idx="2"/>
+          </p:cNvCxnSpPr>
+          <p:nvPr/>
+        </p:nvCxnSpPr>
+        <p:spPr>
+          <a:xfrm flipH="1">
+            <a:off x="3948875" y="3530041"/>
+            <a:ext cx="1637465" cy="1364806"/>
+          </a:xfrm>
+          <a:prstGeom prst="straightConnector1">
+            <a:avLst/>
+          </a:prstGeom>
+          <a:ln>
+            <a:tailEnd type="triangle"/>
+          </a:ln>
+        </p:spPr>
+        <p:style>
+          <a:lnRef idx="3">
+            <a:schemeClr val="accent4"/>
+          </a:lnRef>
+          <a:fillRef idx="0">
+            <a:schemeClr val="accent4"/>
+          </a:fillRef>
+          <a:effectRef idx="2">
+            <a:schemeClr val="accent4"/>
+          </a:effectRef>
+          <a:fontRef idx="minor">
+            <a:schemeClr val="tx1"/>
+          </a:fontRef>
+        </p:style>
+      </p:cxnSp>
+      <p:cxnSp>
+        <p:nvCxnSpPr>
+          <p:cNvPr id="128" name="Straight Arrow Connector 127"/>
+          <p:cNvCxnSpPr>
+            <a:stCxn id="10" idx="6"/>
+            <a:endCxn id="15" idx="2"/>
+          </p:cNvCxnSpPr>
+          <p:nvPr/>
+        </p:nvCxnSpPr>
+        <p:spPr>
+          <a:xfrm flipH="1" flipV="1">
+            <a:off x="2621996" y="2753180"/>
+            <a:ext cx="2964344" cy="776861"/>
+          </a:xfrm>
+          <a:prstGeom prst="straightConnector1">
+            <a:avLst/>
+          </a:prstGeom>
+          <a:ln>
+            <a:tailEnd type="triangle"/>
+          </a:ln>
+        </p:spPr>
+        <p:style>
+          <a:lnRef idx="3">
+            <a:schemeClr val="accent4"/>
+          </a:lnRef>
+          <a:fillRef idx="0">
+            <a:schemeClr val="accent4"/>
+          </a:fillRef>
+          <a:effectRef idx="2">
+            <a:schemeClr val="accent4"/>
+          </a:effectRef>
+          <a:fontRef idx="minor">
+            <a:schemeClr val="tx1"/>
+          </a:fontRef>
+        </p:style>
+      </p:cxnSp>
+      <p:cxnSp>
+        <p:nvCxnSpPr>
+          <p:cNvPr id="130" name="Straight Arrow Connector 129"/>
+          <p:cNvCxnSpPr>
+            <a:stCxn id="10" idx="6"/>
+            <a:endCxn id="16" idx="2"/>
+          </p:cNvCxnSpPr>
+          <p:nvPr/>
+        </p:nvCxnSpPr>
+        <p:spPr>
+          <a:xfrm flipV="1">
+            <a:off x="5586340" y="1309692"/>
+            <a:ext cx="3543163" cy="2220349"/>
+          </a:xfrm>
+          <a:prstGeom prst="straightConnector1">
+            <a:avLst/>
+          </a:prstGeom>
+          <a:ln>
+            <a:tailEnd type="triangle"/>
+          </a:ln>
+        </p:spPr>
+        <p:style>
+          <a:lnRef idx="3">
+            <a:schemeClr val="accent4"/>
+          </a:lnRef>
+          <a:fillRef idx="0">
+            <a:schemeClr val="accent4"/>
+          </a:fillRef>
+          <a:effectRef idx="2">
+            <a:schemeClr val="accent4"/>
+          </a:effectRef>
+          <a:fontRef idx="minor">
+            <a:schemeClr val="tx1"/>
+          </a:fontRef>
+        </p:style>
+      </p:cxnSp>
+      <p:cxnSp>
+        <p:nvCxnSpPr>
+          <p:cNvPr id="132" name="Straight Arrow Connector 131"/>
+          <p:cNvCxnSpPr>
+            <a:stCxn id="10" idx="6"/>
+            <a:endCxn id="14" idx="2"/>
+          </p:cNvCxnSpPr>
+          <p:nvPr/>
+        </p:nvCxnSpPr>
+        <p:spPr>
+          <a:xfrm flipH="1" flipV="1">
+            <a:off x="3133319" y="1829789"/>
+            <a:ext cx="2453021" cy="1700252"/>
+          </a:xfrm>
+          <a:prstGeom prst="straightConnector1">
+            <a:avLst/>
+          </a:prstGeom>
+          <a:ln>
+            <a:tailEnd type="triangle"/>
+          </a:ln>
+        </p:spPr>
+        <p:style>
+          <a:lnRef idx="3">
+            <a:schemeClr val="accent4"/>
+          </a:lnRef>
+          <a:fillRef idx="0">
+            <a:schemeClr val="accent4"/>
+          </a:fillRef>
+          <a:effectRef idx="2">
+            <a:schemeClr val="accent4"/>
+          </a:effectRef>
+          <a:fontRef idx="minor">
+            <a:schemeClr val="tx1"/>
+          </a:fontRef>
+        </p:style>
+      </p:cxnSp>
+      <p:cxnSp>
+        <p:nvCxnSpPr>
+          <p:cNvPr id="134" name="Straight Arrow Connector 133"/>
+          <p:cNvCxnSpPr>
+            <a:stCxn id="8" idx="6"/>
+            <a:endCxn id="9" idx="2"/>
+          </p:cNvCxnSpPr>
+          <p:nvPr/>
+        </p:nvCxnSpPr>
+        <p:spPr>
+          <a:xfrm>
+            <a:off x="1813105" y="3548078"/>
+            <a:ext cx="535570" cy="1656103"/>
+          </a:xfrm>
+          <a:prstGeom prst="straightConnector1">
+            <a:avLst/>
+          </a:prstGeom>
+          <a:ln>
+            <a:tailEnd type="triangle"/>
+          </a:ln>
+        </p:spPr>
+        <p:style>
+          <a:lnRef idx="3">
+            <a:schemeClr val="accent4"/>
+          </a:lnRef>
+          <a:fillRef idx="0">
+            <a:schemeClr val="accent4"/>
+          </a:fillRef>
+          <a:effectRef idx="2">
+            <a:schemeClr val="accent4"/>
+          </a:effectRef>
+          <a:fontRef idx="minor">
+            <a:schemeClr val="tx1"/>
+          </a:fontRef>
+        </p:style>
+      </p:cxnSp>
+      <p:cxnSp>
+        <p:nvCxnSpPr>
+          <p:cNvPr id="136" name="Straight Arrow Connector 135"/>
+          <p:cNvCxnSpPr>
+            <a:stCxn id="8" idx="6"/>
+            <a:endCxn id="18" idx="2"/>
+          </p:cNvCxnSpPr>
+          <p:nvPr/>
+        </p:nvCxnSpPr>
+        <p:spPr>
+          <a:xfrm>
+            <a:off x="1813105" y="3548078"/>
+            <a:ext cx="3097661" cy="2093241"/>
+          </a:xfrm>
+          <a:prstGeom prst="straightConnector1">
+            <a:avLst/>
+          </a:prstGeom>
+          <a:ln>
+            <a:tailEnd type="triangle"/>
+          </a:ln>
+        </p:spPr>
+        <p:style>
+          <a:lnRef idx="3">
+            <a:schemeClr val="accent4"/>
+          </a:lnRef>
+          <a:fillRef idx="0">
+            <a:schemeClr val="accent4"/>
+          </a:fillRef>
+          <a:effectRef idx="2">
+            <a:schemeClr val="accent4"/>
+          </a:effectRef>
+          <a:fontRef idx="minor">
+            <a:schemeClr val="tx1"/>
+          </a:fontRef>
+        </p:style>
+      </p:cxnSp>
+      <p:cxnSp>
+        <p:nvCxnSpPr>
+          <p:cNvPr id="138" name="Straight Arrow Connector 137"/>
+          <p:cNvCxnSpPr>
+            <a:stCxn id="8" idx="6"/>
+            <a:endCxn id="11" idx="2"/>
+          </p:cNvCxnSpPr>
+          <p:nvPr/>
+        </p:nvCxnSpPr>
+        <p:spPr>
+          <a:xfrm>
+            <a:off x="1813105" y="3548078"/>
+            <a:ext cx="2135770" cy="1346769"/>
+          </a:xfrm>
+          <a:prstGeom prst="straightConnector1">
+            <a:avLst/>
+          </a:prstGeom>
+          <a:ln>
+            <a:tailEnd type="triangle"/>
+          </a:ln>
+        </p:spPr>
+        <p:style>
+          <a:lnRef idx="3">
+            <a:schemeClr val="accent4"/>
+          </a:lnRef>
+          <a:fillRef idx="0">
+            <a:schemeClr val="accent4"/>
+          </a:fillRef>
+          <a:effectRef idx="2">
+            <a:schemeClr val="accent4"/>
+          </a:effectRef>
+          <a:fontRef idx="minor">
+            <a:schemeClr val="tx1"/>
+          </a:fontRef>
+        </p:style>
+      </p:cxnSp>
+      <p:cxnSp>
+        <p:nvCxnSpPr>
+          <p:cNvPr id="140" name="Straight Arrow Connector 139"/>
+          <p:cNvCxnSpPr>
+            <a:stCxn id="8" idx="6"/>
+            <a:endCxn id="15" idx="2"/>
+          </p:cNvCxnSpPr>
+          <p:nvPr/>
+        </p:nvCxnSpPr>
+        <p:spPr>
+          <a:xfrm flipV="1">
+            <a:off x="1813105" y="2753180"/>
+            <a:ext cx="808891" cy="794898"/>
+          </a:xfrm>
+          <a:prstGeom prst="straightConnector1">
+            <a:avLst/>
+          </a:prstGeom>
+          <a:ln>
+            <a:tailEnd type="triangle"/>
+          </a:ln>
+        </p:spPr>
+        <p:style>
+          <a:lnRef idx="3">
+            <a:schemeClr val="accent4"/>
+          </a:lnRef>
+          <a:fillRef idx="0">
+            <a:schemeClr val="accent4"/>
+          </a:fillRef>
+          <a:effectRef idx="2">
+            <a:schemeClr val="accent4"/>
+          </a:effectRef>
+          <a:fontRef idx="minor">
+            <a:schemeClr val="tx1"/>
+          </a:fontRef>
+        </p:style>
+      </p:cxnSp>
+      <p:cxnSp>
+        <p:nvCxnSpPr>
+          <p:cNvPr id="142" name="Straight Arrow Connector 141"/>
+          <p:cNvCxnSpPr>
+            <a:stCxn id="20" idx="6"/>
+            <a:endCxn id="13" idx="2"/>
+          </p:cNvCxnSpPr>
+          <p:nvPr/>
+        </p:nvCxnSpPr>
+        <p:spPr>
+          <a:xfrm flipV="1">
+            <a:off x="3294806" y="3507081"/>
+            <a:ext cx="3091377" cy="2831081"/>
+          </a:xfrm>
+          <a:prstGeom prst="straightConnector1">
+            <a:avLst/>
+          </a:prstGeom>
+          <a:ln>
+            <a:tailEnd type="triangle"/>
+          </a:ln>
+        </p:spPr>
+        <p:style>
+          <a:lnRef idx="3">
+            <a:schemeClr val="accent4"/>
+          </a:lnRef>
+          <a:fillRef idx="0">
+            <a:schemeClr val="accent4"/>
+          </a:fillRef>
+          <a:effectRef idx="2">
+            <a:schemeClr val="accent4"/>
+          </a:effectRef>
+          <a:fontRef idx="minor">
+            <a:schemeClr val="tx1"/>
+          </a:fontRef>
+        </p:style>
+      </p:cxnSp>
+      <p:cxnSp>
+        <p:nvCxnSpPr>
+          <p:cNvPr id="144" name="Straight Arrow Connector 143"/>
+          <p:cNvCxnSpPr>
+            <a:stCxn id="20" idx="6"/>
+            <a:endCxn id="17" idx="2"/>
+          </p:cNvCxnSpPr>
+          <p:nvPr/>
+        </p:nvCxnSpPr>
+        <p:spPr>
+          <a:xfrm flipV="1">
+            <a:off x="3294806" y="6091263"/>
+            <a:ext cx="2961022" cy="246899"/>
+          </a:xfrm>
+          <a:prstGeom prst="straightConnector1">
+            <a:avLst/>
+          </a:prstGeom>
+          <a:ln>
+            <a:tailEnd type="triangle"/>
+          </a:ln>
+        </p:spPr>
+        <p:style>
+          <a:lnRef idx="3">
+            <a:schemeClr val="accent4"/>
+          </a:lnRef>
+          <a:fillRef idx="0">
+            <a:schemeClr val="accent4"/>
+          </a:fillRef>
+          <a:effectRef idx="2">
+            <a:schemeClr val="accent4"/>
+          </a:effectRef>
+          <a:fontRef idx="minor">
+            <a:schemeClr val="tx1"/>
+          </a:fontRef>
+        </p:style>
+      </p:cxnSp>
+      <p:cxnSp>
+        <p:nvCxnSpPr>
+          <p:cNvPr id="146" name="Straight Arrow Connector 145"/>
+          <p:cNvCxnSpPr>
+            <a:stCxn id="20" idx="6"/>
+            <a:endCxn id="9" idx="2"/>
+          </p:cNvCxnSpPr>
+          <p:nvPr/>
+        </p:nvCxnSpPr>
+        <p:spPr>
+          <a:xfrm flipH="1" flipV="1">
+            <a:off x="2348675" y="5204181"/>
+            <a:ext cx="946131" cy="1133981"/>
+          </a:xfrm>
+          <a:prstGeom prst="straightConnector1">
+            <a:avLst/>
+          </a:prstGeom>
+          <a:ln>
+            <a:tailEnd type="triangle"/>
+          </a:ln>
+        </p:spPr>
+        <p:style>
+          <a:lnRef idx="3">
+            <a:schemeClr val="accent4"/>
+          </a:lnRef>
+          <a:fillRef idx="0">
+            <a:schemeClr val="accent4"/>
+          </a:fillRef>
+          <a:effectRef idx="2">
+            <a:schemeClr val="accent4"/>
+          </a:effectRef>
+          <a:fontRef idx="minor">
+            <a:schemeClr val="tx1"/>
+          </a:fontRef>
+        </p:style>
+      </p:cxnSp>
+      <p:cxnSp>
+        <p:nvCxnSpPr>
+          <p:cNvPr id="148" name="Straight Arrow Connector 147"/>
+          <p:cNvCxnSpPr>
+            <a:stCxn id="8" idx="0"/>
+            <a:endCxn id="18" idx="2"/>
+          </p:cNvCxnSpPr>
+          <p:nvPr/>
+        </p:nvCxnSpPr>
+        <p:spPr>
+          <a:xfrm>
+            <a:off x="1355905" y="3090878"/>
+            <a:ext cx="3554861" cy="2550441"/>
+          </a:xfrm>
+          <a:prstGeom prst="straightConnector1">
+            <a:avLst/>
+          </a:prstGeom>
+          <a:ln>
+            <a:tailEnd type="triangle"/>
+          </a:ln>
+        </p:spPr>
+        <p:style>
+          <a:lnRef idx="3">
+            <a:schemeClr val="accent4"/>
+          </a:lnRef>
+          <a:fillRef idx="0">
+            <a:schemeClr val="accent4"/>
+          </a:fillRef>
+          <a:effectRef idx="2">
+            <a:schemeClr val="accent4"/>
+          </a:effectRef>
+          <a:fontRef idx="minor">
+            <a:schemeClr val="tx1"/>
+          </a:fontRef>
+        </p:style>
+      </p:cxnSp>
+      <p:cxnSp>
+        <p:nvCxnSpPr>
+          <p:cNvPr id="152" name="Straight Arrow Connector 151"/>
+          <p:cNvCxnSpPr>
+            <a:stCxn id="4" idx="6"/>
+            <a:endCxn id="17" idx="2"/>
+          </p:cNvCxnSpPr>
+          <p:nvPr/>
+        </p:nvCxnSpPr>
+        <p:spPr>
+          <a:xfrm>
+            <a:off x="1728642" y="5880962"/>
+            <a:ext cx="4527186" cy="210301"/>
+          </a:xfrm>
+          <a:prstGeom prst="straightConnector1">
+            <a:avLst/>
+          </a:prstGeom>
+          <a:ln>
+            <a:tailEnd type="triangle"/>
+          </a:ln>
+        </p:spPr>
+        <p:style>
+          <a:lnRef idx="3">
+            <a:schemeClr val="accent4"/>
+          </a:lnRef>
+          <a:fillRef idx="0">
+            <a:schemeClr val="accent4"/>
+          </a:fillRef>
+          <a:effectRef idx="2">
+            <a:schemeClr val="accent4"/>
+          </a:effectRef>
+          <a:fontRef idx="minor">
+            <a:schemeClr val="tx1"/>
+          </a:fontRef>
+        </p:style>
+      </p:cxnSp>
+      <p:cxnSp>
+        <p:nvCxnSpPr>
+          <p:cNvPr id="154" name="Straight Arrow Connector 153"/>
+          <p:cNvCxnSpPr>
+            <a:stCxn id="4" idx="6"/>
+            <a:endCxn id="9" idx="2"/>
+          </p:cNvCxnSpPr>
+          <p:nvPr/>
+        </p:nvCxnSpPr>
+        <p:spPr>
+          <a:xfrm flipV="1">
+            <a:off x="1728642" y="5204181"/>
+            <a:ext cx="620033" cy="676781"/>
+          </a:xfrm>
+          <a:prstGeom prst="straightConnector1">
+            <a:avLst/>
+          </a:prstGeom>
+          <a:ln>
+            <a:tailEnd type="triangle"/>
+          </a:ln>
+        </p:spPr>
+        <p:style>
+          <a:lnRef idx="3">
+            <a:schemeClr val="accent4"/>
+          </a:lnRef>
+          <a:fillRef idx="0">
+            <a:schemeClr val="accent4"/>
+          </a:fillRef>
+          <a:effectRef idx="2">
+            <a:schemeClr val="accent4"/>
+          </a:effectRef>
+          <a:fontRef idx="minor">
+            <a:schemeClr val="tx1"/>
+          </a:fontRef>
+        </p:style>
+      </p:cxnSp>
+      <p:cxnSp>
+        <p:nvCxnSpPr>
+          <p:cNvPr id="156" name="Straight Arrow Connector 155"/>
+          <p:cNvCxnSpPr>
+            <a:stCxn id="4" idx="6"/>
+            <a:endCxn id="18" idx="2"/>
+          </p:cNvCxnSpPr>
+          <p:nvPr/>
+        </p:nvCxnSpPr>
+        <p:spPr>
+          <a:xfrm flipV="1">
+            <a:off x="1728642" y="5641319"/>
+            <a:ext cx="3182124" cy="239643"/>
+          </a:xfrm>
+          <a:prstGeom prst="straightConnector1">
+            <a:avLst/>
+          </a:prstGeom>
+          <a:ln>
+            <a:tailEnd type="triangle"/>
+          </a:ln>
+        </p:spPr>
+        <p:style>
+          <a:lnRef idx="3">
+            <a:schemeClr val="accent4"/>
+          </a:lnRef>
+          <a:fillRef idx="0">
+            <a:schemeClr val="accent4"/>
+          </a:fillRef>
+          <a:effectRef idx="2">
+            <a:schemeClr val="accent4"/>
+          </a:effectRef>
+          <a:fontRef idx="minor">
+            <a:schemeClr val="tx1"/>
+          </a:fontRef>
+        </p:style>
+      </p:cxnSp>
+      <p:cxnSp>
+        <p:nvCxnSpPr>
+          <p:cNvPr id="158" name="Straight Arrow Connector 157"/>
+          <p:cNvCxnSpPr>
+            <a:stCxn id="4" idx="6"/>
+            <a:endCxn id="11" idx="2"/>
+          </p:cNvCxnSpPr>
+          <p:nvPr/>
+        </p:nvCxnSpPr>
+        <p:spPr>
+          <a:xfrm flipV="1">
+            <a:off x="1728642" y="4894847"/>
+            <a:ext cx="2220233" cy="986115"/>
+          </a:xfrm>
+          <a:prstGeom prst="straightConnector1">
+            <a:avLst/>
+          </a:prstGeom>
+          <a:ln>
+            <a:tailEnd type="triangle"/>
+          </a:ln>
+        </p:spPr>
+        <p:style>
+          <a:lnRef idx="3">
+            <a:schemeClr val="accent4"/>
+          </a:lnRef>
+          <a:fillRef idx="0">
+            <a:schemeClr val="accent4"/>
+          </a:fillRef>
+          <a:effectRef idx="2">
+            <a:schemeClr val="accent4"/>
+          </a:effectRef>
+          <a:fontRef idx="minor">
+            <a:schemeClr val="tx1"/>
+          </a:fontRef>
+        </p:style>
+      </p:cxnSp>
+    </p:spTree>
+    <p:extLst>
+      <p:ext uri="{BB962C8B-B14F-4D97-AF65-F5344CB8AC3E}">
+        <p14:creationId xmlns:p14="http://schemas.microsoft.com/office/powerpoint/2010/main" val="817809255"/>
       </p:ext>
     </p:extLst>
   </p:cSld>

</xml_diff>